<commit_message>
Reworked LPC55S69 Zone Example
</commit_message>
<xml_diff>
--- a/CMSIS/DoxyGen/Zone/src/images/CMSIS_Zone.pptx
+++ b/CMSIS/DoxyGen/Zone/src/images/CMSIS_Zone.pptx
@@ -5,10 +5,10 @@
     <p:sldMasterId id="2147483726" r:id="rId5"/>
   </p:sldMasterIdLst>
   <p:notesMasterIdLst>
-    <p:notesMasterId r:id="rId13"/>
+    <p:notesMasterId r:id="rId14"/>
   </p:notesMasterIdLst>
   <p:handoutMasterIdLst>
-    <p:handoutMasterId r:id="rId14"/>
+    <p:handoutMasterId r:id="rId15"/>
   </p:handoutMasterIdLst>
   <p:sldIdLst>
     <p:sldId id="369" r:id="rId6"/>
@@ -18,6 +18,7 @@
     <p:sldId id="378" r:id="rId10"/>
     <p:sldId id="374" r:id="rId11"/>
     <p:sldId id="376" r:id="rId12"/>
+    <p:sldId id="379" r:id="rId13"/>
   </p:sldIdLst>
   <p:sldSz cx="9144000" cy="5143500" type="screen16x9"/>
   <p:notesSz cx="6858000" cy="9144000"/>
@@ -252,7 +253,7 @@
               <a:rPr lang="en-US" smtClean="0">
                 <a:latin typeface="Gill Sans MT"/>
               </a:rPr>
-              <a:t>8/6/2018</a:t>
+              <a:t>2019-07-04</a:t>
             </a:fld>
             <a:endParaRPr lang="en-US" dirty="0">
               <a:latin typeface="Gill Sans MT"/>
@@ -431,7 +432,7 @@
             <a:fld id="{49FE4451-D2A5-554E-B842-8C4F3752E2A4}" type="datetimeFigureOut">
               <a:rPr lang="en-US" smtClean="0"/>
               <a:pPr/>
-              <a:t>8/6/2018</a:t>
+              <a:t>2019-07-04</a:t>
             </a:fld>
             <a:endParaRPr lang="en-US" dirty="0"/>
           </a:p>
@@ -20853,6 +20854,1148 @@
     <p:extLst>
       <p:ext uri="{BB962C8B-B14F-4D97-AF65-F5344CB8AC3E}">
         <p14:creationId xmlns:p14="http://schemas.microsoft.com/office/powerpoint/2010/main" val="3269818"/>
+      </p:ext>
+    </p:extLst>
+  </p:cSld>
+  <p:clrMapOvr>
+    <a:masterClrMapping/>
+  </p:clrMapOvr>
+</p:sld>
+</file>
+
+<file path=ppt/slides/slide8.xml><?xml version="1.0" encoding="utf-8"?>
+<p:sld xmlns:a="http://schemas.openxmlformats.org/drawingml/2006/main" xmlns:r="http://schemas.openxmlformats.org/officeDocument/2006/relationships" xmlns:p="http://schemas.openxmlformats.org/presentationml/2006/main">
+  <p:cSld>
+    <p:spTree>
+      <p:nvGrpSpPr>
+        <p:cNvPr id="1" name=""/>
+        <p:cNvGrpSpPr/>
+        <p:nvPr/>
+      </p:nvGrpSpPr>
+      <p:grpSpPr>
+        <a:xfrm>
+          <a:off x="0" y="0"/>
+          <a:ext cx="0" cy="0"/>
+          <a:chOff x="0" y="0"/>
+          <a:chExt cx="0" cy="0"/>
+        </a:xfrm>
+      </p:grpSpPr>
+      <p:sp>
+        <p:nvSpPr>
+          <p:cNvPr id="60" name="TextBox 59">
+            <a:extLst>
+              <a:ext uri="{FF2B5EF4-FFF2-40B4-BE49-F238E27FC236}">
+                <a16:creationId xmlns:a16="http://schemas.microsoft.com/office/drawing/2014/main" id="{52049D08-E9EE-4BCE-942E-28ED4F39EE35}"/>
+              </a:ext>
+            </a:extLst>
+          </p:cNvPr>
+          <p:cNvSpPr txBox="1"/>
+          <p:nvPr/>
+        </p:nvSpPr>
+        <p:spPr>
+          <a:xfrm>
+            <a:off x="288130" y="1440482"/>
+            <a:ext cx="2428258" cy="261610"/>
+          </a:xfrm>
+          <a:prstGeom prst="rect">
+            <a:avLst/>
+          </a:prstGeom>
+          <a:noFill/>
+        </p:spPr>
+        <p:txBody>
+          <a:bodyPr wrap="square" rtlCol="0">
+            <a:spAutoFit/>
+          </a:bodyPr>
+          <a:lstStyle/>
+          <a:p>
+            <a:r>
+              <a:rPr lang="en-US" sz="1100" dirty="0">
+                <a:solidFill>
+                  <a:schemeClr val="tx1">
+                    <a:lumMod val="60000"/>
+                    <a:lumOff val="40000"/>
+                  </a:schemeClr>
+                </a:solidFill>
+              </a:rPr>
+              <a:t>system_LPC55S69_cm33_core0.h</a:t>
+            </a:r>
+          </a:p>
+        </p:txBody>
+      </p:sp>
+      <p:sp>
+        <p:nvSpPr>
+          <p:cNvPr id="6" name="Oval 5">
+            <a:extLst>
+              <a:ext uri="{FF2B5EF4-FFF2-40B4-BE49-F238E27FC236}">
+                <a16:creationId xmlns:a16="http://schemas.microsoft.com/office/drawing/2014/main" id="{352617A8-FA63-4EF0-9CD2-5D6637F325D3}"/>
+              </a:ext>
+            </a:extLst>
+          </p:cNvPr>
+          <p:cNvSpPr/>
+          <p:nvPr/>
+        </p:nvSpPr>
+        <p:spPr>
+          <a:xfrm>
+            <a:off x="288130" y="244591"/>
+            <a:ext cx="2448000" cy="376850"/>
+          </a:xfrm>
+          <a:prstGeom prst="ellipse">
+            <a:avLst/>
+          </a:prstGeom>
+          <a:solidFill>
+            <a:schemeClr val="accent6">
+              <a:lumMod val="50000"/>
+            </a:schemeClr>
+          </a:solidFill>
+          <a:ln>
+            <a:noFill/>
+          </a:ln>
+        </p:spPr>
+        <p:style>
+          <a:lnRef idx="2">
+            <a:schemeClr val="accent1">
+              <a:shade val="50000"/>
+            </a:schemeClr>
+          </a:lnRef>
+          <a:fillRef idx="1">
+            <a:schemeClr val="accent1"/>
+          </a:fillRef>
+          <a:effectRef idx="0">
+            <a:schemeClr val="accent1"/>
+          </a:effectRef>
+          <a:fontRef idx="minor">
+            <a:schemeClr val="lt1"/>
+          </a:fontRef>
+        </p:style>
+        <p:txBody>
+          <a:bodyPr rtlCol="0" anchor="ctr"/>
+          <a:lstStyle/>
+          <a:p>
+            <a:pPr algn="ctr"/>
+            <a:r>
+              <a:rPr lang="en-US" sz="1400" dirty="0"/>
+              <a:t>Reset</a:t>
+            </a:r>
+          </a:p>
+        </p:txBody>
+      </p:sp>
+      <p:sp>
+        <p:nvSpPr>
+          <p:cNvPr id="9" name="Rectangle 8">
+            <a:extLst>
+              <a:ext uri="{FF2B5EF4-FFF2-40B4-BE49-F238E27FC236}">
+                <a16:creationId xmlns:a16="http://schemas.microsoft.com/office/drawing/2014/main" id="{877A1B7A-CDEB-42E5-8297-E2F99B7CAB83}"/>
+              </a:ext>
+            </a:extLst>
+          </p:cNvPr>
+          <p:cNvSpPr/>
+          <p:nvPr/>
+        </p:nvSpPr>
+        <p:spPr>
+          <a:xfrm>
+            <a:off x="288130" y="852007"/>
+            <a:ext cx="2448000" cy="487414"/>
+          </a:xfrm>
+          <a:prstGeom prst="rect">
+            <a:avLst/>
+          </a:prstGeom>
+          <a:solidFill>
+            <a:srgbClr val="128CAB"/>
+          </a:solidFill>
+          <a:ln>
+            <a:noFill/>
+          </a:ln>
+        </p:spPr>
+        <p:style>
+          <a:lnRef idx="2">
+            <a:schemeClr val="accent1">
+              <a:shade val="50000"/>
+            </a:schemeClr>
+          </a:lnRef>
+          <a:fillRef idx="1">
+            <a:schemeClr val="accent1"/>
+          </a:fillRef>
+          <a:effectRef idx="0">
+            <a:schemeClr val="accent1"/>
+          </a:effectRef>
+          <a:fontRef idx="minor">
+            <a:schemeClr val="lt1"/>
+          </a:fontRef>
+        </p:style>
+        <p:txBody>
+          <a:bodyPr rtlCol="0" anchor="ctr"/>
+          <a:lstStyle/>
+          <a:p>
+            <a:pPr algn="ctr"/>
+            <a:r>
+              <a:rPr lang="en-US" sz="1400" dirty="0"/>
+              <a:t>Execute </a:t>
+            </a:r>
+          </a:p>
+          <a:p>
+            <a:pPr algn="ctr"/>
+            <a:r>
+              <a:rPr lang="en-US" sz="1400" dirty="0"/>
+              <a:t>Reset Handler</a:t>
+            </a:r>
+          </a:p>
+        </p:txBody>
+      </p:sp>
+      <p:cxnSp>
+        <p:nvCxnSpPr>
+          <p:cNvPr id="11" name="Straight Arrow Connector 10">
+            <a:extLst>
+              <a:ext uri="{FF2B5EF4-FFF2-40B4-BE49-F238E27FC236}">
+                <a16:creationId xmlns:a16="http://schemas.microsoft.com/office/drawing/2014/main" id="{D0F90F8C-AC58-4943-9620-51BDB2A93D9C}"/>
+              </a:ext>
+            </a:extLst>
+          </p:cNvPr>
+          <p:cNvCxnSpPr>
+            <a:cxnSpLocks/>
+            <a:stCxn id="6" idx="4"/>
+            <a:endCxn id="9" idx="0"/>
+          </p:cNvCxnSpPr>
+          <p:nvPr/>
+        </p:nvCxnSpPr>
+        <p:spPr>
+          <a:xfrm>
+            <a:off x="1512130" y="621441"/>
+            <a:ext cx="0" cy="230566"/>
+          </a:xfrm>
+          <a:prstGeom prst="straightConnector1">
+            <a:avLst/>
+          </a:prstGeom>
+          <a:ln w="9525" cap="flat" cmpd="sng" algn="ctr">
+            <a:solidFill>
+              <a:schemeClr val="dk1"/>
+            </a:solidFill>
+            <a:prstDash val="dash"/>
+            <a:round/>
+            <a:headEnd type="none" w="med" len="med"/>
+            <a:tailEnd type="triangle" w="med" len="med"/>
+          </a:ln>
+        </p:spPr>
+        <p:style>
+          <a:lnRef idx="0">
+            <a:scrgbClr r="0" g="0" b="0"/>
+          </a:lnRef>
+          <a:fillRef idx="0">
+            <a:scrgbClr r="0" g="0" b="0"/>
+          </a:fillRef>
+          <a:effectRef idx="0">
+            <a:scrgbClr r="0" g="0" b="0"/>
+          </a:effectRef>
+          <a:fontRef idx="minor">
+            <a:schemeClr val="tx1"/>
+          </a:fontRef>
+        </p:style>
+      </p:cxnSp>
+      <p:sp>
+        <p:nvSpPr>
+          <p:cNvPr id="16" name="Rectangle 15">
+            <a:extLst>
+              <a:ext uri="{FF2B5EF4-FFF2-40B4-BE49-F238E27FC236}">
+                <a16:creationId xmlns:a16="http://schemas.microsoft.com/office/drawing/2014/main" id="{51EC84FB-76DB-448E-A973-8ABF5E48E1F3}"/>
+              </a:ext>
+            </a:extLst>
+          </p:cNvPr>
+          <p:cNvSpPr/>
+          <p:nvPr/>
+        </p:nvSpPr>
+        <p:spPr>
+          <a:xfrm>
+            <a:off x="288130" y="1695879"/>
+            <a:ext cx="2448000" cy="360000"/>
+          </a:xfrm>
+          <a:prstGeom prst="rect">
+            <a:avLst/>
+          </a:prstGeom>
+          <a:solidFill>
+            <a:srgbClr val="128CAB"/>
+          </a:solidFill>
+          <a:ln>
+            <a:noFill/>
+          </a:ln>
+        </p:spPr>
+        <p:style>
+          <a:lnRef idx="2">
+            <a:schemeClr val="accent1">
+              <a:shade val="50000"/>
+            </a:schemeClr>
+          </a:lnRef>
+          <a:fillRef idx="1">
+            <a:schemeClr val="accent1"/>
+          </a:fillRef>
+          <a:effectRef idx="0">
+            <a:schemeClr val="accent1"/>
+          </a:effectRef>
+          <a:fontRef idx="minor">
+            <a:schemeClr val="lt1"/>
+          </a:fontRef>
+        </p:style>
+        <p:txBody>
+          <a:bodyPr rtlCol="0" anchor="ctr"/>
+          <a:lstStyle/>
+          <a:p>
+            <a:pPr algn="ctr"/>
+            <a:r>
+              <a:rPr lang="en-US" sz="1400" dirty="0" err="1">
+                <a:solidFill>
+                  <a:schemeClr val="bg1"/>
+                </a:solidFill>
+                <a:latin typeface="Courier New" panose="02070309020205020404" pitchFamily="49" charset="0"/>
+                <a:cs typeface="Courier New" panose="02070309020205020404" pitchFamily="49" charset="0"/>
+              </a:rPr>
+              <a:t>SystemInit</a:t>
+            </a:r>
+            <a:r>
+              <a:rPr lang="en-US" sz="1400" dirty="0">
+                <a:solidFill>
+                  <a:schemeClr val="bg1"/>
+                </a:solidFill>
+                <a:latin typeface="Courier New" panose="02070309020205020404" pitchFamily="49" charset="0"/>
+                <a:cs typeface="Courier New" panose="02070309020205020404" pitchFamily="49" charset="0"/>
+              </a:rPr>
+              <a:t>()</a:t>
+            </a:r>
+            <a:endParaRPr lang="en-US" sz="1400" dirty="0">
+              <a:solidFill>
+                <a:schemeClr val="bg1"/>
+              </a:solidFill>
+            </a:endParaRPr>
+          </a:p>
+        </p:txBody>
+      </p:sp>
+      <p:sp>
+        <p:nvSpPr>
+          <p:cNvPr id="17" name="Rectangle 16">
+            <a:extLst>
+              <a:ext uri="{FF2B5EF4-FFF2-40B4-BE49-F238E27FC236}">
+                <a16:creationId xmlns:a16="http://schemas.microsoft.com/office/drawing/2014/main" id="{B4CCBE86-CF6C-4174-AC74-1D4CBB06D893}"/>
+              </a:ext>
+            </a:extLst>
+          </p:cNvPr>
+          <p:cNvSpPr/>
+          <p:nvPr/>
+        </p:nvSpPr>
+        <p:spPr>
+          <a:xfrm>
+            <a:off x="288130" y="3444079"/>
+            <a:ext cx="2448000" cy="360000"/>
+          </a:xfrm>
+          <a:prstGeom prst="rect">
+            <a:avLst/>
+          </a:prstGeom>
+          <a:solidFill>
+            <a:srgbClr val="128CAB"/>
+          </a:solidFill>
+          <a:ln>
+            <a:noFill/>
+          </a:ln>
+        </p:spPr>
+        <p:style>
+          <a:lnRef idx="2">
+            <a:schemeClr val="accent1">
+              <a:shade val="50000"/>
+            </a:schemeClr>
+          </a:lnRef>
+          <a:fillRef idx="1">
+            <a:schemeClr val="accent1"/>
+          </a:fillRef>
+          <a:effectRef idx="0">
+            <a:schemeClr val="accent1"/>
+          </a:effectRef>
+          <a:fontRef idx="minor">
+            <a:schemeClr val="lt1"/>
+          </a:fontRef>
+        </p:style>
+        <p:txBody>
+          <a:bodyPr rtlCol="0" anchor="ctr"/>
+          <a:lstStyle/>
+          <a:p>
+            <a:pPr algn="ctr"/>
+            <a:r>
+              <a:rPr lang="en-US" sz="1400" dirty="0">
+                <a:latin typeface="Courier New" panose="02070309020205020404" pitchFamily="49" charset="0"/>
+                <a:cs typeface="Courier New" panose="02070309020205020404" pitchFamily="49" charset="0"/>
+              </a:rPr>
+              <a:t>__main(void)</a:t>
+            </a:r>
+          </a:p>
+        </p:txBody>
+      </p:sp>
+      <p:sp>
+        <p:nvSpPr>
+          <p:cNvPr id="30" name="Rectangle 29">
+            <a:extLst>
+              <a:ext uri="{FF2B5EF4-FFF2-40B4-BE49-F238E27FC236}">
+                <a16:creationId xmlns:a16="http://schemas.microsoft.com/office/drawing/2014/main" id="{71B69540-8240-4C98-8047-4209A7DA45A6}"/>
+              </a:ext>
+            </a:extLst>
+          </p:cNvPr>
+          <p:cNvSpPr/>
+          <p:nvPr/>
+        </p:nvSpPr>
+        <p:spPr>
+          <a:xfrm>
+            <a:off x="288130" y="2418758"/>
+            <a:ext cx="2448000" cy="360000"/>
+          </a:xfrm>
+          <a:prstGeom prst="rect">
+            <a:avLst/>
+          </a:prstGeom>
+          <a:solidFill>
+            <a:srgbClr val="128CAB"/>
+          </a:solidFill>
+          <a:ln>
+            <a:noFill/>
+          </a:ln>
+        </p:spPr>
+        <p:style>
+          <a:lnRef idx="2">
+            <a:schemeClr val="accent1">
+              <a:shade val="50000"/>
+            </a:schemeClr>
+          </a:lnRef>
+          <a:fillRef idx="1">
+            <a:schemeClr val="accent1"/>
+          </a:fillRef>
+          <a:effectRef idx="0">
+            <a:schemeClr val="accent1"/>
+          </a:effectRef>
+          <a:fontRef idx="minor">
+            <a:schemeClr val="lt1"/>
+          </a:fontRef>
+        </p:style>
+        <p:txBody>
+          <a:bodyPr rtlCol="0" anchor="ctr"/>
+          <a:lstStyle/>
+          <a:p>
+            <a:pPr algn="ctr"/>
+            <a:r>
+              <a:rPr lang="en-US" sz="1400" dirty="0" err="1">
+                <a:solidFill>
+                  <a:schemeClr val="bg1"/>
+                </a:solidFill>
+                <a:latin typeface="Courier New" panose="02070309020205020404" pitchFamily="49" charset="0"/>
+                <a:cs typeface="Courier New" panose="02070309020205020404" pitchFamily="49" charset="0"/>
+              </a:rPr>
+              <a:t>SystemInitHook</a:t>
+            </a:r>
+            <a:r>
+              <a:rPr lang="en-US" sz="1400" dirty="0">
+                <a:solidFill>
+                  <a:schemeClr val="bg1"/>
+                </a:solidFill>
+                <a:latin typeface="Courier New" panose="02070309020205020404" pitchFamily="49" charset="0"/>
+                <a:cs typeface="Courier New" panose="02070309020205020404" pitchFamily="49" charset="0"/>
+              </a:rPr>
+              <a:t>()</a:t>
+            </a:r>
+            <a:endParaRPr lang="en-US" sz="1400" dirty="0">
+              <a:solidFill>
+                <a:schemeClr val="bg1"/>
+              </a:solidFill>
+            </a:endParaRPr>
+          </a:p>
+        </p:txBody>
+      </p:sp>
+      <p:sp>
+        <p:nvSpPr>
+          <p:cNvPr id="32" name="Rectangle 31">
+            <a:extLst>
+              <a:ext uri="{FF2B5EF4-FFF2-40B4-BE49-F238E27FC236}">
+                <a16:creationId xmlns:a16="http://schemas.microsoft.com/office/drawing/2014/main" id="{67AF0B0F-3BB9-483F-8EA4-5CE68F88A609}"/>
+              </a:ext>
+            </a:extLst>
+          </p:cNvPr>
+          <p:cNvSpPr/>
+          <p:nvPr/>
+        </p:nvSpPr>
+        <p:spPr>
+          <a:xfrm>
+            <a:off x="3070630" y="2418758"/>
+            <a:ext cx="2448000" cy="360000"/>
+          </a:xfrm>
+          <a:prstGeom prst="rect">
+            <a:avLst/>
+          </a:prstGeom>
+          <a:solidFill>
+            <a:srgbClr val="128CAB"/>
+          </a:solidFill>
+          <a:ln>
+            <a:noFill/>
+          </a:ln>
+        </p:spPr>
+        <p:style>
+          <a:lnRef idx="2">
+            <a:schemeClr val="accent1">
+              <a:shade val="50000"/>
+            </a:schemeClr>
+          </a:lnRef>
+          <a:fillRef idx="1">
+            <a:schemeClr val="accent1"/>
+          </a:fillRef>
+          <a:effectRef idx="0">
+            <a:schemeClr val="accent1"/>
+          </a:effectRef>
+          <a:fontRef idx="minor">
+            <a:schemeClr val="lt1"/>
+          </a:fontRef>
+        </p:style>
+        <p:txBody>
+          <a:bodyPr rtlCol="0" anchor="ctr"/>
+          <a:lstStyle/>
+          <a:p>
+            <a:pPr algn="ctr"/>
+            <a:r>
+              <a:rPr lang="en-US" sz="1400" dirty="0" err="1">
+                <a:solidFill>
+                  <a:schemeClr val="bg1"/>
+                </a:solidFill>
+                <a:latin typeface="Courier New" panose="02070309020205020404" pitchFamily="49" charset="0"/>
+                <a:cs typeface="Courier New" panose="02070309020205020404" pitchFamily="49" charset="0"/>
+              </a:rPr>
+              <a:t>BOARD_InitTrustZone</a:t>
+            </a:r>
+            <a:r>
+              <a:rPr lang="en-US" sz="1400" dirty="0">
+                <a:solidFill>
+                  <a:schemeClr val="bg1"/>
+                </a:solidFill>
+                <a:latin typeface="Courier New" panose="02070309020205020404" pitchFamily="49" charset="0"/>
+                <a:cs typeface="Courier New" panose="02070309020205020404" pitchFamily="49" charset="0"/>
+              </a:rPr>
+              <a:t>()</a:t>
+            </a:r>
+            <a:endParaRPr lang="en-US" sz="1400" dirty="0">
+              <a:solidFill>
+                <a:schemeClr val="bg1"/>
+              </a:solidFill>
+            </a:endParaRPr>
+          </a:p>
+        </p:txBody>
+      </p:sp>
+      <p:sp>
+        <p:nvSpPr>
+          <p:cNvPr id="33" name="Rectangle 32">
+            <a:extLst>
+              <a:ext uri="{FF2B5EF4-FFF2-40B4-BE49-F238E27FC236}">
+                <a16:creationId xmlns:a16="http://schemas.microsoft.com/office/drawing/2014/main" id="{3368452A-B271-4347-9265-4E87A061FC22}"/>
+              </a:ext>
+            </a:extLst>
+          </p:cNvPr>
+          <p:cNvSpPr/>
+          <p:nvPr/>
+        </p:nvSpPr>
+        <p:spPr>
+          <a:xfrm>
+            <a:off x="5806102" y="2418758"/>
+            <a:ext cx="2448000" cy="720000"/>
+          </a:xfrm>
+          <a:prstGeom prst="rect">
+            <a:avLst/>
+          </a:prstGeom>
+          <a:solidFill>
+            <a:srgbClr val="128CAB"/>
+          </a:solidFill>
+          <a:ln>
+            <a:noFill/>
+          </a:ln>
+        </p:spPr>
+        <p:style>
+          <a:lnRef idx="2">
+            <a:schemeClr val="accent1">
+              <a:shade val="50000"/>
+            </a:schemeClr>
+          </a:lnRef>
+          <a:fillRef idx="1">
+            <a:schemeClr val="accent1"/>
+          </a:fillRef>
+          <a:effectRef idx="0">
+            <a:schemeClr val="accent1"/>
+          </a:effectRef>
+          <a:fontRef idx="minor">
+            <a:schemeClr val="lt1"/>
+          </a:fontRef>
+        </p:style>
+        <p:txBody>
+          <a:bodyPr rtlCol="0" anchor="ctr"/>
+          <a:lstStyle/>
+          <a:p>
+            <a:pPr algn="ctr"/>
+            <a:r>
+              <a:rPr lang="en-US" sz="1400" dirty="0" err="1">
+                <a:solidFill>
+                  <a:schemeClr val="bg1"/>
+                </a:solidFill>
+                <a:latin typeface="Courier New" panose="02070309020205020404" pitchFamily="49" charset="0"/>
+                <a:cs typeface="Courier New" panose="02070309020205020404" pitchFamily="49" charset="0"/>
+              </a:rPr>
+              <a:t>TZM_Config_MPC</a:t>
+            </a:r>
+            <a:r>
+              <a:rPr lang="en-US" sz="1400" dirty="0">
+                <a:solidFill>
+                  <a:schemeClr val="bg1"/>
+                </a:solidFill>
+                <a:latin typeface="Courier New" panose="02070309020205020404" pitchFamily="49" charset="0"/>
+                <a:cs typeface="Courier New" panose="02070309020205020404" pitchFamily="49" charset="0"/>
+              </a:rPr>
+              <a:t>();</a:t>
+            </a:r>
+          </a:p>
+          <a:p>
+            <a:pPr algn="ctr"/>
+            <a:r>
+              <a:rPr lang="en-US" sz="1400" dirty="0" err="1">
+                <a:solidFill>
+                  <a:schemeClr val="bg1"/>
+                </a:solidFill>
+                <a:latin typeface="Courier New" panose="02070309020205020404" pitchFamily="49" charset="0"/>
+                <a:cs typeface="Courier New" panose="02070309020205020404" pitchFamily="49" charset="0"/>
+              </a:rPr>
+              <a:t>TZM_Config_PPC</a:t>
+            </a:r>
+            <a:r>
+              <a:rPr lang="en-US" sz="1400" dirty="0">
+                <a:solidFill>
+                  <a:schemeClr val="bg1"/>
+                </a:solidFill>
+                <a:latin typeface="Courier New" panose="02070309020205020404" pitchFamily="49" charset="0"/>
+                <a:cs typeface="Courier New" panose="02070309020205020404" pitchFamily="49" charset="0"/>
+              </a:rPr>
+              <a:t>();</a:t>
+            </a:r>
+            <a:endParaRPr lang="en-US" sz="1400" dirty="0">
+              <a:solidFill>
+                <a:schemeClr val="bg1"/>
+              </a:solidFill>
+            </a:endParaRPr>
+          </a:p>
+          <a:p>
+            <a:pPr algn="ctr"/>
+            <a:r>
+              <a:rPr lang="en-US" sz="1400" dirty="0" err="1">
+                <a:solidFill>
+                  <a:schemeClr val="bg1"/>
+                </a:solidFill>
+                <a:latin typeface="Courier New" panose="02070309020205020404" pitchFamily="49" charset="0"/>
+                <a:cs typeface="Courier New" panose="02070309020205020404" pitchFamily="49" charset="0"/>
+              </a:rPr>
+              <a:t>TZM_Config_SAU</a:t>
+            </a:r>
+            <a:r>
+              <a:rPr lang="en-US" sz="1400" dirty="0">
+                <a:solidFill>
+                  <a:schemeClr val="bg1"/>
+                </a:solidFill>
+                <a:latin typeface="Courier New" panose="02070309020205020404" pitchFamily="49" charset="0"/>
+                <a:cs typeface="Courier New" panose="02070309020205020404" pitchFamily="49" charset="0"/>
+              </a:rPr>
+              <a:t>();</a:t>
+            </a:r>
+            <a:endParaRPr lang="en-US" sz="1400" dirty="0">
+              <a:solidFill>
+                <a:schemeClr val="bg1"/>
+              </a:solidFill>
+            </a:endParaRPr>
+          </a:p>
+        </p:txBody>
+      </p:sp>
+      <p:cxnSp>
+        <p:nvCxnSpPr>
+          <p:cNvPr id="38" name="Straight Arrow Connector 37">
+            <a:extLst>
+              <a:ext uri="{FF2B5EF4-FFF2-40B4-BE49-F238E27FC236}">
+                <a16:creationId xmlns:a16="http://schemas.microsoft.com/office/drawing/2014/main" id="{5402039D-AB17-4A55-B663-4D871DA12D5D}"/>
+              </a:ext>
+            </a:extLst>
+          </p:cNvPr>
+          <p:cNvCxnSpPr>
+            <a:cxnSpLocks/>
+            <a:stCxn id="9" idx="2"/>
+            <a:endCxn id="16" idx="0"/>
+          </p:cNvCxnSpPr>
+          <p:nvPr/>
+        </p:nvCxnSpPr>
+        <p:spPr>
+          <a:xfrm>
+            <a:off x="1512130" y="1339421"/>
+            <a:ext cx="0" cy="356458"/>
+          </a:xfrm>
+          <a:prstGeom prst="straightConnector1">
+            <a:avLst/>
+          </a:prstGeom>
+          <a:ln w="9525" cap="flat" cmpd="sng" algn="ctr">
+            <a:solidFill>
+              <a:schemeClr val="dk1"/>
+            </a:solidFill>
+            <a:prstDash val="dash"/>
+            <a:round/>
+            <a:headEnd type="none" w="med" len="med"/>
+            <a:tailEnd type="triangle" w="med" len="med"/>
+          </a:ln>
+        </p:spPr>
+        <p:style>
+          <a:lnRef idx="0">
+            <a:scrgbClr r="0" g="0" b="0"/>
+          </a:lnRef>
+          <a:fillRef idx="0">
+            <a:scrgbClr r="0" g="0" b="0"/>
+          </a:fillRef>
+          <a:effectRef idx="0">
+            <a:scrgbClr r="0" g="0" b="0"/>
+          </a:effectRef>
+          <a:fontRef idx="minor">
+            <a:schemeClr val="tx1"/>
+          </a:fontRef>
+        </p:style>
+      </p:cxnSp>
+      <p:cxnSp>
+        <p:nvCxnSpPr>
+          <p:cNvPr id="41" name="Straight Arrow Connector 40">
+            <a:extLst>
+              <a:ext uri="{FF2B5EF4-FFF2-40B4-BE49-F238E27FC236}">
+                <a16:creationId xmlns:a16="http://schemas.microsoft.com/office/drawing/2014/main" id="{AC456FC7-852C-47FE-BE02-3568B767D28D}"/>
+              </a:ext>
+            </a:extLst>
+          </p:cNvPr>
+          <p:cNvCxnSpPr>
+            <a:cxnSpLocks/>
+            <a:stCxn id="16" idx="2"/>
+            <a:endCxn id="30" idx="0"/>
+          </p:cNvCxnSpPr>
+          <p:nvPr/>
+        </p:nvCxnSpPr>
+        <p:spPr>
+          <a:xfrm>
+            <a:off x="1512130" y="2055879"/>
+            <a:ext cx="0" cy="362879"/>
+          </a:xfrm>
+          <a:prstGeom prst="straightConnector1">
+            <a:avLst/>
+          </a:prstGeom>
+          <a:ln w="9525" cap="flat" cmpd="sng" algn="ctr">
+            <a:solidFill>
+              <a:schemeClr val="dk1"/>
+            </a:solidFill>
+            <a:prstDash val="dash"/>
+            <a:round/>
+            <a:headEnd type="none" w="med" len="med"/>
+            <a:tailEnd type="triangle" w="med" len="med"/>
+          </a:ln>
+        </p:spPr>
+        <p:style>
+          <a:lnRef idx="0">
+            <a:scrgbClr r="0" g="0" b="0"/>
+          </a:lnRef>
+          <a:fillRef idx="0">
+            <a:scrgbClr r="0" g="0" b="0"/>
+          </a:fillRef>
+          <a:effectRef idx="0">
+            <a:scrgbClr r="0" g="0" b="0"/>
+          </a:effectRef>
+          <a:fontRef idx="minor">
+            <a:schemeClr val="tx1"/>
+          </a:fontRef>
+        </p:style>
+      </p:cxnSp>
+      <p:cxnSp>
+        <p:nvCxnSpPr>
+          <p:cNvPr id="44" name="Straight Arrow Connector 43">
+            <a:extLst>
+              <a:ext uri="{FF2B5EF4-FFF2-40B4-BE49-F238E27FC236}">
+                <a16:creationId xmlns:a16="http://schemas.microsoft.com/office/drawing/2014/main" id="{89777F31-018C-4906-AB4E-0F37C420F471}"/>
+              </a:ext>
+            </a:extLst>
+          </p:cNvPr>
+          <p:cNvCxnSpPr>
+            <a:cxnSpLocks/>
+            <a:stCxn id="30" idx="3"/>
+            <a:endCxn id="32" idx="1"/>
+          </p:cNvCxnSpPr>
+          <p:nvPr/>
+        </p:nvCxnSpPr>
+        <p:spPr>
+          <a:xfrm>
+            <a:off x="2736130" y="2598758"/>
+            <a:ext cx="334500" cy="0"/>
+          </a:xfrm>
+          <a:prstGeom prst="straightConnector1">
+            <a:avLst/>
+          </a:prstGeom>
+          <a:ln w="9525" cap="flat" cmpd="sng" algn="ctr">
+            <a:solidFill>
+              <a:schemeClr val="dk1"/>
+            </a:solidFill>
+            <a:prstDash val="dash"/>
+            <a:round/>
+            <a:headEnd type="none" w="med" len="med"/>
+            <a:tailEnd type="triangle" w="med" len="med"/>
+          </a:ln>
+        </p:spPr>
+        <p:style>
+          <a:lnRef idx="0">
+            <a:scrgbClr r="0" g="0" b="0"/>
+          </a:lnRef>
+          <a:fillRef idx="0">
+            <a:scrgbClr r="0" g="0" b="0"/>
+          </a:fillRef>
+          <a:effectRef idx="0">
+            <a:scrgbClr r="0" g="0" b="0"/>
+          </a:effectRef>
+          <a:fontRef idx="minor">
+            <a:schemeClr val="tx1"/>
+          </a:fontRef>
+        </p:style>
+      </p:cxnSp>
+      <p:cxnSp>
+        <p:nvCxnSpPr>
+          <p:cNvPr id="54" name="Connector: Elbow 53">
+            <a:extLst>
+              <a:ext uri="{FF2B5EF4-FFF2-40B4-BE49-F238E27FC236}">
+                <a16:creationId xmlns:a16="http://schemas.microsoft.com/office/drawing/2014/main" id="{F0DEC3D6-5C2E-4D43-839B-D929285399C8}"/>
+              </a:ext>
+            </a:extLst>
+          </p:cNvPr>
+          <p:cNvCxnSpPr>
+            <a:cxnSpLocks/>
+            <a:stCxn id="33" idx="2"/>
+            <a:endCxn id="17" idx="3"/>
+          </p:cNvCxnSpPr>
+          <p:nvPr/>
+        </p:nvCxnSpPr>
+        <p:spPr>
+          <a:xfrm rot="5400000">
+            <a:off x="4640456" y="1234432"/>
+            <a:ext cx="485321" cy="4293972"/>
+          </a:xfrm>
+          <a:prstGeom prst="bentConnector2">
+            <a:avLst/>
+          </a:prstGeom>
+          <a:ln w="9525" cmpd="sng">
+            <a:solidFill>
+              <a:schemeClr val="tx1"/>
+            </a:solidFill>
+            <a:prstDash val="dash"/>
+            <a:headEnd type="none" w="med" len="med"/>
+            <a:tailEnd type="triangle"/>
+          </a:ln>
+          <a:effectLst/>
+        </p:spPr>
+        <p:style>
+          <a:lnRef idx="2">
+            <a:schemeClr val="accent1"/>
+          </a:lnRef>
+          <a:fillRef idx="0">
+            <a:schemeClr val="accent1"/>
+          </a:fillRef>
+          <a:effectRef idx="1">
+            <a:schemeClr val="accent1"/>
+          </a:effectRef>
+          <a:fontRef idx="minor">
+            <a:schemeClr val="tx1"/>
+          </a:fontRef>
+        </p:style>
+      </p:cxnSp>
+      <p:cxnSp>
+        <p:nvCxnSpPr>
+          <p:cNvPr id="55" name="Connector: Elbow 54">
+            <a:extLst>
+              <a:ext uri="{FF2B5EF4-FFF2-40B4-BE49-F238E27FC236}">
+                <a16:creationId xmlns:a16="http://schemas.microsoft.com/office/drawing/2014/main" id="{7554D2E7-01A9-4504-B3E5-FAA87B006506}"/>
+              </a:ext>
+            </a:extLst>
+          </p:cNvPr>
+          <p:cNvCxnSpPr>
+            <a:cxnSpLocks/>
+            <a:stCxn id="32" idx="3"/>
+            <a:endCxn id="33" idx="1"/>
+          </p:cNvCxnSpPr>
+          <p:nvPr/>
+        </p:nvCxnSpPr>
+        <p:spPr>
+          <a:xfrm>
+            <a:off x="5518630" y="2598758"/>
+            <a:ext cx="287472" cy="180000"/>
+          </a:xfrm>
+          <a:prstGeom prst="bentConnector3">
+            <a:avLst>
+              <a:gd name="adj1" fmla="val 50000"/>
+            </a:avLst>
+          </a:prstGeom>
+          <a:ln w="9525" cmpd="sng">
+            <a:solidFill>
+              <a:schemeClr val="tx1"/>
+            </a:solidFill>
+            <a:prstDash val="dash"/>
+            <a:headEnd type="none" w="med" len="med"/>
+            <a:tailEnd type="triangle"/>
+          </a:ln>
+          <a:effectLst/>
+        </p:spPr>
+        <p:style>
+          <a:lnRef idx="2">
+            <a:schemeClr val="accent1"/>
+          </a:lnRef>
+          <a:fillRef idx="0">
+            <a:schemeClr val="accent1"/>
+          </a:fillRef>
+          <a:effectRef idx="1">
+            <a:schemeClr val="accent1"/>
+          </a:effectRef>
+          <a:fontRef idx="minor">
+            <a:schemeClr val="tx1"/>
+          </a:fontRef>
+        </p:style>
+      </p:cxnSp>
+      <p:sp>
+        <p:nvSpPr>
+          <p:cNvPr id="58" name="TextBox 57">
+            <a:extLst>
+              <a:ext uri="{FF2B5EF4-FFF2-40B4-BE49-F238E27FC236}">
+                <a16:creationId xmlns:a16="http://schemas.microsoft.com/office/drawing/2014/main" id="{C4A87B43-ACD5-494B-84BA-2EC7756A4968}"/>
+              </a:ext>
+            </a:extLst>
+          </p:cNvPr>
+          <p:cNvSpPr txBox="1"/>
+          <p:nvPr/>
+        </p:nvSpPr>
+        <p:spPr>
+          <a:xfrm>
+            <a:off x="3070407" y="2157147"/>
+            <a:ext cx="2428258" cy="261610"/>
+          </a:xfrm>
+          <a:prstGeom prst="rect">
+            <a:avLst/>
+          </a:prstGeom>
+          <a:noFill/>
+        </p:spPr>
+        <p:txBody>
+          <a:bodyPr wrap="square" rtlCol="0">
+            <a:spAutoFit/>
+          </a:bodyPr>
+          <a:lstStyle/>
+          <a:p>
+            <a:r>
+              <a:rPr lang="en-US" sz="1100" dirty="0" err="1">
+                <a:solidFill>
+                  <a:schemeClr val="tx1">
+                    <a:lumMod val="60000"/>
+                    <a:lumOff val="40000"/>
+                  </a:schemeClr>
+                </a:solidFill>
+              </a:rPr>
+              <a:t>tzm_config.c</a:t>
+            </a:r>
+            <a:endParaRPr lang="en-US" sz="1100" dirty="0">
+              <a:solidFill>
+                <a:schemeClr val="tx1">
+                  <a:lumMod val="60000"/>
+                  <a:lumOff val="40000"/>
+                </a:schemeClr>
+              </a:solidFill>
+            </a:endParaRPr>
+          </a:p>
+        </p:txBody>
+      </p:sp>
+      <p:sp>
+        <p:nvSpPr>
+          <p:cNvPr id="59" name="TextBox 58">
+            <a:extLst>
+              <a:ext uri="{FF2B5EF4-FFF2-40B4-BE49-F238E27FC236}">
+                <a16:creationId xmlns:a16="http://schemas.microsoft.com/office/drawing/2014/main" id="{3739D284-2208-47D8-AA23-FD7C8E7AA9B0}"/>
+              </a:ext>
+            </a:extLst>
+          </p:cNvPr>
+          <p:cNvSpPr txBox="1"/>
+          <p:nvPr/>
+        </p:nvSpPr>
+        <p:spPr>
+          <a:xfrm>
+            <a:off x="5806102" y="1818593"/>
+            <a:ext cx="2428258" cy="600164"/>
+          </a:xfrm>
+          <a:prstGeom prst="rect">
+            <a:avLst/>
+          </a:prstGeom>
+          <a:noFill/>
+        </p:spPr>
+        <p:txBody>
+          <a:bodyPr wrap="square" rtlCol="0">
+            <a:spAutoFit/>
+          </a:bodyPr>
+          <a:lstStyle/>
+          <a:p>
+            <a:r>
+              <a:rPr lang="en-US" sz="1100" dirty="0" err="1">
+                <a:solidFill>
+                  <a:schemeClr val="tx1">
+                    <a:lumMod val="60000"/>
+                    <a:lumOff val="40000"/>
+                  </a:schemeClr>
+                </a:solidFill>
+              </a:rPr>
+              <a:t>tzm_config_mpc.c</a:t>
+            </a:r>
+            <a:endParaRPr lang="en-US" sz="1100" dirty="0">
+              <a:solidFill>
+                <a:schemeClr val="tx1">
+                  <a:lumMod val="60000"/>
+                  <a:lumOff val="40000"/>
+                </a:schemeClr>
+              </a:solidFill>
+            </a:endParaRPr>
+          </a:p>
+          <a:p>
+            <a:r>
+              <a:rPr lang="en-US" sz="1100" dirty="0" err="1">
+                <a:solidFill>
+                  <a:schemeClr val="tx1">
+                    <a:lumMod val="60000"/>
+                    <a:lumOff val="40000"/>
+                  </a:schemeClr>
+                </a:solidFill>
+              </a:rPr>
+              <a:t>tzm_config_ppc.c</a:t>
+            </a:r>
+            <a:endParaRPr lang="en-US" sz="1100" dirty="0">
+              <a:solidFill>
+                <a:schemeClr val="tx1">
+                  <a:lumMod val="60000"/>
+                  <a:lumOff val="40000"/>
+                </a:schemeClr>
+              </a:solidFill>
+            </a:endParaRPr>
+          </a:p>
+          <a:p>
+            <a:r>
+              <a:rPr lang="en-US" sz="1100" dirty="0" err="1">
+                <a:solidFill>
+                  <a:schemeClr val="tx1">
+                    <a:lumMod val="60000"/>
+                    <a:lumOff val="40000"/>
+                  </a:schemeClr>
+                </a:solidFill>
+              </a:rPr>
+              <a:t>tzm_config_sau.c</a:t>
+            </a:r>
+            <a:endParaRPr lang="en-US" sz="1100" dirty="0">
+              <a:solidFill>
+                <a:schemeClr val="tx1">
+                  <a:lumMod val="60000"/>
+                  <a:lumOff val="40000"/>
+                </a:schemeClr>
+              </a:solidFill>
+            </a:endParaRPr>
+          </a:p>
+        </p:txBody>
+      </p:sp>
+      <p:sp>
+        <p:nvSpPr>
+          <p:cNvPr id="18" name="TextBox 17">
+            <a:extLst>
+              <a:ext uri="{FF2B5EF4-FFF2-40B4-BE49-F238E27FC236}">
+                <a16:creationId xmlns:a16="http://schemas.microsoft.com/office/drawing/2014/main" id="{1B4A1A03-7F89-41C5-9CB1-3770A7658147}"/>
+              </a:ext>
+            </a:extLst>
+          </p:cNvPr>
+          <p:cNvSpPr txBox="1"/>
+          <p:nvPr/>
+        </p:nvSpPr>
+        <p:spPr>
+          <a:xfrm>
+            <a:off x="288130" y="3182469"/>
+            <a:ext cx="2428258" cy="261610"/>
+          </a:xfrm>
+          <a:prstGeom prst="rect">
+            <a:avLst/>
+          </a:prstGeom>
+          <a:noFill/>
+        </p:spPr>
+        <p:txBody>
+          <a:bodyPr wrap="square" rtlCol="0">
+            <a:spAutoFit/>
+          </a:bodyPr>
+          <a:lstStyle/>
+          <a:p>
+            <a:r>
+              <a:rPr lang="en-US" sz="1100" dirty="0" err="1">
+                <a:solidFill>
+                  <a:schemeClr val="tx1">
+                    <a:lumMod val="60000"/>
+                    <a:lumOff val="40000"/>
+                  </a:schemeClr>
+                </a:solidFill>
+              </a:rPr>
+              <a:t>hello_world_s.c</a:t>
+            </a:r>
+            <a:endParaRPr lang="en-US" sz="1100" dirty="0">
+              <a:solidFill>
+                <a:schemeClr val="tx1">
+                  <a:lumMod val="60000"/>
+                  <a:lumOff val="40000"/>
+                </a:schemeClr>
+              </a:solidFill>
+            </a:endParaRPr>
+          </a:p>
+        </p:txBody>
+      </p:sp>
+      <p:sp>
+        <p:nvSpPr>
+          <p:cNvPr id="19" name="TextBox 18">
+            <a:extLst>
+              <a:ext uri="{FF2B5EF4-FFF2-40B4-BE49-F238E27FC236}">
+                <a16:creationId xmlns:a16="http://schemas.microsoft.com/office/drawing/2014/main" id="{28FF6988-323D-45F4-A740-E6F7B63FCB27}"/>
+              </a:ext>
+            </a:extLst>
+          </p:cNvPr>
+          <p:cNvSpPr txBox="1"/>
+          <p:nvPr/>
+        </p:nvSpPr>
+        <p:spPr>
+          <a:xfrm>
+            <a:off x="288130" y="2157148"/>
+            <a:ext cx="2428258" cy="261610"/>
+          </a:xfrm>
+          <a:prstGeom prst="rect">
+            <a:avLst/>
+          </a:prstGeom>
+          <a:noFill/>
+        </p:spPr>
+        <p:txBody>
+          <a:bodyPr wrap="square" rtlCol="0">
+            <a:spAutoFit/>
+          </a:bodyPr>
+          <a:lstStyle/>
+          <a:p>
+            <a:r>
+              <a:rPr lang="en-US" sz="1100" dirty="0" err="1">
+                <a:solidFill>
+                  <a:schemeClr val="tx1">
+                    <a:lumMod val="60000"/>
+                    <a:lumOff val="40000"/>
+                  </a:schemeClr>
+                </a:solidFill>
+              </a:rPr>
+              <a:t>hello_world_s.c</a:t>
+            </a:r>
+            <a:endParaRPr lang="en-US" sz="1100" dirty="0">
+              <a:solidFill>
+                <a:schemeClr val="tx1">
+                  <a:lumMod val="60000"/>
+                  <a:lumOff val="40000"/>
+                </a:schemeClr>
+              </a:solidFill>
+            </a:endParaRPr>
+          </a:p>
+        </p:txBody>
+      </p:sp>
+    </p:spTree>
+    <p:extLst>
+      <p:ext uri="{BB962C8B-B14F-4D97-AF65-F5344CB8AC3E}">
+        <p14:creationId xmlns:p14="http://schemas.microsoft.com/office/powerpoint/2010/main" val="469875603"/>
       </p:ext>
     </p:extLst>
   </p:cSld>
@@ -21864,52 +23007,6 @@
 
 <file path=customXml/item1.xml><?xml version="1.0" encoding="utf-8"?>
 <?mso-contentType ?>
-<spe:Receivers xmlns:spe="http://schemas.microsoft.com/sharepoint/events">
-  <Receiver>
-    <Name>Document ID Generator</Name>
-    <Synchronization>Synchronous</Synchronization>
-    <Type>10001</Type>
-    <SequenceNumber>1000</SequenceNumber>
-    <Assembly>Microsoft.Office.DocumentManagement, Version=14.0.0.0, Culture=neutral, PublicKeyToken=71e9bce111e9429c</Assembly>
-    <Class>Microsoft.Office.DocumentManagement.Internal.DocIdHandler</Class>
-    <Data/>
-    <Filter/>
-  </Receiver>
-  <Receiver>
-    <Name>Document ID Generator</Name>
-    <Synchronization>Synchronous</Synchronization>
-    <Type>10002</Type>
-    <SequenceNumber>1001</SequenceNumber>
-    <Assembly>Microsoft.Office.DocumentManagement, Version=14.0.0.0, Culture=neutral, PublicKeyToken=71e9bce111e9429c</Assembly>
-    <Class>Microsoft.Office.DocumentManagement.Internal.DocIdHandler</Class>
-    <Data/>
-    <Filter/>
-  </Receiver>
-  <Receiver>
-    <Name>Document ID Generator</Name>
-    <Synchronization>Synchronous</Synchronization>
-    <Type>10004</Type>
-    <SequenceNumber>1002</SequenceNumber>
-    <Assembly>Microsoft.Office.DocumentManagement, Version=14.0.0.0, Culture=neutral, PublicKeyToken=71e9bce111e9429c</Assembly>
-    <Class>Microsoft.Office.DocumentManagement.Internal.DocIdHandler</Class>
-    <Data/>
-    <Filter/>
-  </Receiver>
-  <Receiver>
-    <Name>Document ID Generator</Name>
-    <Synchronization>Synchronous</Synchronization>
-    <Type>10006</Type>
-    <SequenceNumber>1003</SequenceNumber>
-    <Assembly>Microsoft.Office.DocumentManagement, Version=14.0.0.0, Culture=neutral, PublicKeyToken=71e9bce111e9429c</Assembly>
-    <Class>Microsoft.Office.DocumentManagement.Internal.DocIdHandler</Class>
-    <Data/>
-    <Filter/>
-  </Receiver>
-</spe:Receivers>
-</file>
-
-<file path=customXml/item2.xml><?xml version="1.0" encoding="utf-8"?>
-<?mso-contentType ?>
 <FormTemplates xmlns="http://schemas.microsoft.com/sharepoint/v3/contenttype/forms">
   <Display>DocumentLibraryForm</Display>
   <Edit>DocumentLibraryForm</Edit>
@@ -21917,7 +23014,7 @@
 </FormTemplates>
 </file>
 
-<file path=customXml/item3.xml><?xml version="1.0" encoding="utf-8"?>
+<file path=customXml/item2.xml><?xml version="1.0" encoding="utf-8"?>
 <p:properties xmlns:p="http://schemas.microsoft.com/office/2006/metadata/properties" xmlns:xsi="http://www.w3.org/2001/XMLSchema-instance" xmlns:pc="http://schemas.microsoft.com/office/infopath/2007/PartnerControls">
   <documentManagement>
     <_dlc_DocId xmlns="f2ad5090-61a8-4b8c-ab70-68f4ff4d1933">ARM-ECM-0491503</_dlc_DocId>
@@ -21929,7 +23026,7 @@
 </p:properties>
 </file>
 
-<file path=customXml/item4.xml><?xml version="1.0" encoding="utf-8"?>
+<file path=customXml/item3.xml><?xml version="1.0" encoding="utf-8"?>
 <ct:contentTypeSchema xmlns:ct="http://schemas.microsoft.com/office/2006/metadata/contentType" xmlns:ma="http://schemas.microsoft.com/office/2006/metadata/properties/metaAttributes" ct:_="" ma:_="" ma:contentTypeName="Document" ma:contentTypeID="0x0101005953A7A3657A61428D34982CE3100E9A" ma:contentTypeVersion="0" ma:contentTypeDescription="Create a new document." ma:contentTypeScope="" ma:versionID="9d7dbb0d33bb298decf17a3b04476177">
   <xsd:schema xmlns:xsd="http://www.w3.org/2001/XMLSchema" xmlns:xs="http://www.w3.org/2001/XMLSchema" xmlns:p="http://schemas.microsoft.com/office/2006/metadata/properties" xmlns:ns2="f2ad5090-61a8-4b8c-ab70-68f4ff4d1933" targetNamespace="http://schemas.microsoft.com/office/2006/metadata/properties" ma:root="true" ma:fieldsID="653440191449dc6dbdd54d77bba038f8" ns2:_="">
     <xsd:import namespace="f2ad5090-61a8-4b8c-ab70-68f4ff4d1933"/>
@@ -22074,15 +23171,53 @@
 </ct:contentTypeSchema>
 </file>
 
-<file path=customXml/itemProps1.xml><?xml version="1.0" encoding="utf-8"?>
-<ds:datastoreItem xmlns:ds="http://schemas.openxmlformats.org/officeDocument/2006/customXml" ds:itemID="{75E05AB7-3B6A-492F-8FD0-7267B59BB88B}">
-  <ds:schemaRefs>
-    <ds:schemaRef ds:uri="http://schemas.microsoft.com/sharepoint/events"/>
-  </ds:schemaRefs>
-</ds:datastoreItem>
+<file path=customXml/item4.xml><?xml version="1.0" encoding="utf-8"?>
+<?mso-contentType ?>
+<spe:Receivers xmlns:spe="http://schemas.microsoft.com/sharepoint/events">
+  <Receiver>
+    <Name>Document ID Generator</Name>
+    <Synchronization>Synchronous</Synchronization>
+    <Type>10001</Type>
+    <SequenceNumber>1000</SequenceNumber>
+    <Assembly>Microsoft.Office.DocumentManagement, Version=14.0.0.0, Culture=neutral, PublicKeyToken=71e9bce111e9429c</Assembly>
+    <Class>Microsoft.Office.DocumentManagement.Internal.DocIdHandler</Class>
+    <Data/>
+    <Filter/>
+  </Receiver>
+  <Receiver>
+    <Name>Document ID Generator</Name>
+    <Synchronization>Synchronous</Synchronization>
+    <Type>10002</Type>
+    <SequenceNumber>1001</SequenceNumber>
+    <Assembly>Microsoft.Office.DocumentManagement, Version=14.0.0.0, Culture=neutral, PublicKeyToken=71e9bce111e9429c</Assembly>
+    <Class>Microsoft.Office.DocumentManagement.Internal.DocIdHandler</Class>
+    <Data/>
+    <Filter/>
+  </Receiver>
+  <Receiver>
+    <Name>Document ID Generator</Name>
+    <Synchronization>Synchronous</Synchronization>
+    <Type>10004</Type>
+    <SequenceNumber>1002</SequenceNumber>
+    <Assembly>Microsoft.Office.DocumentManagement, Version=14.0.0.0, Culture=neutral, PublicKeyToken=71e9bce111e9429c</Assembly>
+    <Class>Microsoft.Office.DocumentManagement.Internal.DocIdHandler</Class>
+    <Data/>
+    <Filter/>
+  </Receiver>
+  <Receiver>
+    <Name>Document ID Generator</Name>
+    <Synchronization>Synchronous</Synchronization>
+    <Type>10006</Type>
+    <SequenceNumber>1003</SequenceNumber>
+    <Assembly>Microsoft.Office.DocumentManagement, Version=14.0.0.0, Culture=neutral, PublicKeyToken=71e9bce111e9429c</Assembly>
+    <Class>Microsoft.Office.DocumentManagement.Internal.DocIdHandler</Class>
+    <Data/>
+    <Filter/>
+  </Receiver>
+</spe:Receivers>
 </file>
 
-<file path=customXml/itemProps2.xml><?xml version="1.0" encoding="utf-8"?>
+<file path=customXml/itemProps1.xml><?xml version="1.0" encoding="utf-8"?>
 <ds:datastoreItem xmlns:ds="http://schemas.openxmlformats.org/officeDocument/2006/customXml" ds:itemID="{007E157F-F4C7-4050-8D49-55DB8D1A3AC8}">
   <ds:schemaRefs>
     <ds:schemaRef ds:uri="http://schemas.microsoft.com/sharepoint/v3/contenttype/forms"/>
@@ -22090,7 +23225,7 @@
 </ds:datastoreItem>
 </file>
 
-<file path=customXml/itemProps3.xml><?xml version="1.0" encoding="utf-8"?>
+<file path=customXml/itemProps2.xml><?xml version="1.0" encoding="utf-8"?>
 <ds:datastoreItem xmlns:ds="http://schemas.openxmlformats.org/officeDocument/2006/customXml" ds:itemID="{659AFC57-EF78-4135-9503-D857AFA49F8B}">
   <ds:schemaRefs>
     <ds:schemaRef ds:uri="http://schemas.microsoft.com/office/2006/documentManagement/types"/>
@@ -22106,7 +23241,7 @@
 </ds:datastoreItem>
 </file>
 
-<file path=customXml/itemProps4.xml><?xml version="1.0" encoding="utf-8"?>
+<file path=customXml/itemProps3.xml><?xml version="1.0" encoding="utf-8"?>
 <ds:datastoreItem xmlns:ds="http://schemas.openxmlformats.org/officeDocument/2006/customXml" ds:itemID="{1CBA01FD-69E2-4D69-B064-01637DD45D7D}">
   <ds:schemaRefs>
     <ds:schemaRef ds:uri="http://schemas.microsoft.com/office/2006/metadata/contentType"/>
@@ -22122,4 +23257,12 @@
     <ds:schemaRef ds:uri="http://schemas.microsoft.com/internal/obd"/>
   </ds:schemaRefs>
 </ds:datastoreItem>
+</file>
+
+<file path=customXml/itemProps4.xml><?xml version="1.0" encoding="utf-8"?>
+<ds:datastoreItem xmlns:ds="http://schemas.openxmlformats.org/officeDocument/2006/customXml" ds:itemID="{75E05AB7-3B6A-492F-8FD0-7267B59BB88B}">
+  <ds:schemaRefs>
+    <ds:schemaRef ds:uri="http://schemas.microsoft.com/sharepoint/events"/>
+  </ds:schemaRefs>
+</ds:datastoreItem>
 </file>
</xml_diff>